<commit_message>
Aaron 10/8/2023 1: Added practicum assignment
</commit_message>
<xml_diff>
--- a/Trainings/TR1/Lecture.pptx
+++ b/Trainings/TR1/Lecture.pptx
@@ -5791,14 +5791,14 @@
             <a:r>
               <a:rPr lang="en-US" altLang="en-US">
                 <a:solidFill>
-                  <a:srgbClr val="ED3761"/>
+                  <a:srgbClr val="FD0062"/>
                 </a:solidFill>
               </a:rPr>
               <a:t>Structure</a:t>
             </a:r>
             <a:endParaRPr lang="en-US" altLang="en-US">
               <a:solidFill>
-                <a:srgbClr val="ED3761"/>
+                <a:srgbClr val="FD0062"/>
               </a:solidFill>
             </a:endParaRPr>
           </a:p>
@@ -5950,7 +5950,7 @@
             <a:r>
               <a:rPr lang="en-US" altLang="en-US">
                 <a:solidFill>
-                  <a:srgbClr val="ED3761"/>
+                  <a:srgbClr val="FD0062"/>
                 </a:solidFill>
               </a:rPr>
               <a:t>a</a:t>
@@ -5966,7 +5966,7 @@
             <a:r>
               <a:rPr lang="en-US" altLang="en-US">
                 <a:solidFill>
-                  <a:srgbClr val="ED3761"/>
+                  <a:srgbClr val="FD0062"/>
                 </a:solidFill>
               </a:rPr>
               <a:t>b</a:t>
@@ -5982,7 +5982,7 @@
             <a:r>
               <a:rPr lang="en-US" altLang="en-US">
                 <a:solidFill>
-                  <a:srgbClr val="ED3761"/>
+                  <a:srgbClr val="FD0062"/>
                 </a:solidFill>
               </a:rPr>
               <a:t>a</a:t>
@@ -5998,7 +5998,7 @@
             <a:r>
               <a:rPr lang="en-US" altLang="en-US">
                 <a:solidFill>
-                  <a:srgbClr val="ED3761"/>
+                  <a:srgbClr val="FD0062"/>
                 </a:solidFill>
               </a:rPr>
               <a:t>b</a:t>
@@ -6030,7 +6030,7 @@
             <a:r>
               <a:rPr lang="en-US" altLang="en-US">
                 <a:solidFill>
-                  <a:srgbClr val="ED3761"/>
+                  <a:srgbClr val="FD0062"/>
                 </a:solidFill>
               </a:rPr>
               <a:t>a</a:t>
@@ -6046,7 +6046,7 @@
             <a:r>
               <a:rPr lang="en-US" altLang="en-US">
                 <a:solidFill>
-                  <a:srgbClr val="ED3761"/>
+                  <a:srgbClr val="FD0062"/>
                 </a:solidFill>
               </a:rPr>
               <a:t>b</a:t>
@@ -6062,7 +6062,7 @@
             <a:r>
               <a:rPr lang="en-US" altLang="en-US">
                 <a:solidFill>
-                  <a:srgbClr val="ED3761"/>
+                  <a:srgbClr val="FD0062"/>
                 </a:solidFill>
               </a:rPr>
               <a:t>a</a:t>
@@ -6078,7 +6078,7 @@
             <a:r>
               <a:rPr lang="en-US" altLang="en-US">
                 <a:solidFill>
-                  <a:srgbClr val="ED3761"/>
+                  <a:srgbClr val="FD0062"/>
                 </a:solidFill>
               </a:rPr>
               <a:t>b</a:t>
@@ -6267,14 +6267,14 @@
             <a:r>
               <a:rPr lang="en-US" altLang="en-US">
                 <a:solidFill>
-                  <a:srgbClr val="ED3761"/>
+                  <a:srgbClr val="FD0062"/>
                 </a:solidFill>
               </a:rPr>
               <a:t>What Type of Language is Python?</a:t>
             </a:r>
             <a:endParaRPr lang="en-US" altLang="en-US">
               <a:solidFill>
-                <a:srgbClr val="ED3761"/>
+                <a:srgbClr val="FD0062"/>
               </a:solidFill>
             </a:endParaRPr>
           </a:p>
@@ -6307,7 +6307,7 @@
             <a:r>
               <a:rPr lang="en-US" altLang="en-US" sz="2400">
                 <a:solidFill>
-                  <a:srgbClr val="ED3761"/>
+                  <a:srgbClr val="FD0062"/>
                 </a:solidFill>
               </a:rPr>
               <a:t>high-level</a:t>
@@ -6446,14 +6446,14 @@
             <a:r>
               <a:rPr lang="en-US" altLang="en-US">
                 <a:solidFill>
-                  <a:srgbClr val="ED3761"/>
+                  <a:srgbClr val="FD0062"/>
                 </a:solidFill>
               </a:rPr>
               <a:t>How Python Runs Code</a:t>
             </a:r>
             <a:endParaRPr lang="en-US" altLang="en-US">
               <a:solidFill>
-                <a:srgbClr val="ED3761"/>
+                <a:srgbClr val="FD0062"/>
               </a:solidFill>
             </a:endParaRPr>
           </a:p>
@@ -6626,7 +6626,7 @@
             <a:r>
               <a:rPr lang="en-US" altLang="en-US" sz="1600">
                 <a:solidFill>
-                  <a:srgbClr val="ED3761"/>
+                  <a:srgbClr val="FD0062"/>
                 </a:solidFill>
               </a:rPr>
               <a:t>bytecode will be generated and stored in a .pyc file</a:t>
@@ -6638,7 +6638,7 @@
             <a:r>
               <a:rPr lang="en-US" altLang="en-US" sz="1600">
                 <a:solidFill>
-                  <a:srgbClr val="ED3761"/>
+                  <a:srgbClr val="FD0062"/>
                 </a:solidFill>
               </a:rPr>
               <a:t>the next call will just use the .pyc file</a:t>
@@ -7001,14 +7001,14 @@
             <a:r>
               <a:rPr lang="en-US" altLang="en-US">
                 <a:solidFill>
-                  <a:srgbClr val="ED3761"/>
+                  <a:srgbClr val="FD0062"/>
                 </a:solidFill>
               </a:rPr>
               <a:t>Calling Python</a:t>
             </a:r>
             <a:endParaRPr lang="en-US" altLang="en-US">
               <a:solidFill>
-                <a:srgbClr val="ED3761"/>
+                <a:srgbClr val="FD0062"/>
               </a:solidFill>
             </a:endParaRPr>
           </a:p>
@@ -7395,14 +7395,14 @@
             <a:r>
               <a:rPr lang="en-US" altLang="en-US">
                 <a:solidFill>
-                  <a:srgbClr val="ED3761"/>
+                  <a:srgbClr val="FD0062"/>
                 </a:solidFill>
               </a:rPr>
               <a:t>Script Code</a:t>
             </a:r>
             <a:endParaRPr lang="en-US" altLang="en-US">
               <a:solidFill>
-                <a:srgbClr val="ED3761"/>
+                <a:srgbClr val="FD0062"/>
               </a:solidFill>
             </a:endParaRPr>
           </a:p>
@@ -7545,14 +7545,14 @@
             <a:r>
               <a:rPr lang="en-US" altLang="en-US">
                 <a:solidFill>
-                  <a:srgbClr val="ED3761"/>
+                  <a:srgbClr val="FD0062"/>
                 </a:solidFill>
               </a:rPr>
               <a:t>Functions</a:t>
             </a:r>
             <a:endParaRPr lang="en-US" altLang="en-US">
               <a:solidFill>
-                <a:srgbClr val="ED3761"/>
+                <a:srgbClr val="FD0062"/>
               </a:solidFill>
             </a:endParaRPr>
           </a:p>
@@ -7713,14 +7713,14 @@
             <a:r>
               <a:rPr lang="en-US" altLang="en-US">
                 <a:solidFill>
-                  <a:srgbClr val="ED3761"/>
+                  <a:srgbClr val="FD0062"/>
                 </a:solidFill>
               </a:rPr>
               <a:t>Objects</a:t>
             </a:r>
             <a:endParaRPr lang="en-US" altLang="en-US">
               <a:solidFill>
-                <a:srgbClr val="ED3761"/>
+                <a:srgbClr val="FD0062"/>
               </a:solidFill>
             </a:endParaRPr>
           </a:p>
@@ -7801,7 +7801,7 @@
             <a:r>
               <a:rPr lang="en-US" altLang="en-US" i="1">
                 <a:solidFill>
-                  <a:srgbClr val="ED3761"/>
+                  <a:srgbClr val="FD0062"/>
                 </a:solidFill>
               </a:rPr>
               <a:t>attributes </a:t>
@@ -7829,7 +7829,7 @@
             <a:r>
               <a:rPr lang="en-US" altLang="en-US">
                 <a:solidFill>
-                  <a:srgbClr val="ED3761"/>
+                  <a:srgbClr val="FD0062"/>
                 </a:solidFill>
               </a:rPr>
               <a:t>Attributes </a:t>
@@ -7853,7 +7853,7 @@
             <a:r>
               <a:rPr lang="en-US" altLang="en-US">
                 <a:solidFill>
-                  <a:srgbClr val="ED3761"/>
+                  <a:srgbClr val="FD0062"/>
                 </a:solidFill>
               </a:rPr>
               <a:t>attributes </a:t>
@@ -7877,7 +7877,7 @@
             <a:r>
               <a:rPr lang="en-US" altLang="en-US">
                 <a:solidFill>
-                  <a:srgbClr val="ED3761"/>
+                  <a:srgbClr val="FD0062"/>
                 </a:solidFill>
               </a:rPr>
               <a:t>attributes </a:t>
@@ -7926,7 +7926,7 @@
             <a:r>
               <a:rPr lang="en-US" altLang="en-US">
                 <a:solidFill>
-                  <a:srgbClr val="ED3761"/>
+                  <a:srgbClr val="FD0062"/>
                 </a:solidFill>
                 <a:sym typeface="+mn-ea"/>
               </a:rPr>
@@ -8029,7 +8029,7 @@
             <a:r>
               <a:rPr lang="en-US" altLang="en-US">
                 <a:solidFill>
-                  <a:srgbClr val="ED3761"/>
+                  <a:srgbClr val="FD0062"/>
                 </a:solidFill>
               </a:rPr>
               <a:t>attributes </a:t>
@@ -8193,14 +8193,14 @@
             <a:r>
               <a:rPr lang="en-US" altLang="en-US">
                 <a:solidFill>
-                  <a:srgbClr val="ED3761"/>
+                  <a:srgbClr val="FD0062"/>
                 </a:solidFill>
               </a:rPr>
               <a:t>Python and Objects</a:t>
             </a:r>
             <a:endParaRPr lang="en-US" altLang="en-US">
               <a:solidFill>
-                <a:srgbClr val="ED3761"/>
+                <a:srgbClr val="FD0062"/>
               </a:solidFill>
             </a:endParaRPr>
           </a:p>
@@ -8356,7 +8356,7 @@
             <a:r>
               <a:rPr lang="en-US" altLang="en-US" sz="1600">
                 <a:solidFill>
-                  <a:srgbClr val="ED3761"/>
+                  <a:srgbClr val="FD0062"/>
                 </a:solidFill>
               </a:rPr>
               <a:t>These are not builtin functions!!!!! - </a:t>
@@ -8364,7 +8364,7 @@
             <a:r>
               <a:rPr lang="en-US" altLang="en-US" sz="1600" i="1">
                 <a:solidFill>
-                  <a:srgbClr val="ED3761"/>
+                  <a:srgbClr val="FD0062"/>
                 </a:solidFill>
               </a:rPr>
               <a:t>these are attributes of the meta-class module</a:t>
@@ -8507,11 +8507,19 @@
                   <a:srgbClr val="ED3761"/>
                 </a:solidFill>
               </a:rPr>
-              <a:t> Modules</a:t>
+              <a:t> </a:t>
+            </a:r>
+            <a:r>
+              <a:rPr lang="en-US" altLang="en-US">
+                <a:solidFill>
+                  <a:srgbClr val="FD0062"/>
+                </a:solidFill>
+              </a:rPr>
+              <a:t>Modules</a:t>
             </a:r>
             <a:endParaRPr lang="en-US" altLang="en-US">
               <a:solidFill>
-                <a:srgbClr val="ED3761"/>
+                <a:srgbClr val="FD0062"/>
               </a:solidFill>
             </a:endParaRPr>
           </a:p>
@@ -8944,17 +8952,9 @@
                   <a:schemeClr val="bg1"/>
                 </a:solidFill>
               </a:rPr>
-              <a:t>.p</a:t>
-            </a:r>
-            <a:r>
-              <a:rPr lang="" altLang="en-US" sz="1800">
-                <a:solidFill>
-                  <a:schemeClr val="bg1"/>
-                </a:solidFill>
-              </a:rPr>
-              <a:t>y and LibraryExample</a:t>
-            </a:r>
-            <a:endParaRPr lang="" altLang="en-US" sz="1800">
+              <a:t>.py and LibraryExample</a:t>
+            </a:r>
+            <a:endParaRPr lang="en-US" altLang="en-US" sz="1800">
               <a:solidFill>
                 <a:schemeClr val="bg1"/>
               </a:solidFill>
@@ -9081,14 +9081,14 @@
             <a:r>
               <a:rPr lang="en-US" altLang="en-US">
                 <a:solidFill>
-                  <a:srgbClr val="ED3761"/>
+                  <a:srgbClr val="FD0062"/>
                 </a:solidFill>
               </a:rPr>
               <a:t>Learning Objectives</a:t>
             </a:r>
             <a:endParaRPr lang="en-US" altLang="en-US">
               <a:solidFill>
-                <a:srgbClr val="ED3761"/>
+                <a:srgbClr val="FD0062"/>
               </a:solidFill>
             </a:endParaRPr>
           </a:p>
@@ -9139,10 +9139,18 @@
               <a:buAutoNum type="arabicPeriod"/>
             </a:pPr>
             <a:r>
-              <a:rPr lang="en-US" altLang="en-US"/>
+              <a:rPr lang="en-US" altLang="en-US">
+                <a:solidFill>
+                  <a:srgbClr val="FD0062"/>
+                </a:solidFill>
+              </a:rPr>
               <a:t>Programming fundamentals</a:t>
             </a:r>
-            <a:endParaRPr lang="en-US" altLang="en-US"/>
+            <a:endParaRPr lang="en-US" altLang="en-US">
+              <a:solidFill>
+                <a:srgbClr val="FD0062"/>
+              </a:solidFill>
+            </a:endParaRPr>
           </a:p>
           <a:p>
             <a:pPr marL="457200" indent="-457200">
@@ -9152,7 +9160,11 @@
               <a:buAutoNum type="arabicPeriod"/>
             </a:pPr>
             <a:r>
-              <a:rPr lang="en-US" altLang="en-US"/>
+              <a:rPr lang="en-US" altLang="en-US">
+                <a:solidFill>
+                  <a:srgbClr val="FD0062"/>
+                </a:solidFill>
+              </a:rPr>
               <a:t>Python object structure and flow control</a:t>
             </a:r>
             <a:endParaRPr lang="en-US" altLang="en-US"/>
@@ -9324,14 +9336,14 @@
             <a:r>
               <a:rPr lang="en-US" altLang="en-US">
                 <a:solidFill>
-                  <a:srgbClr val="ED3761"/>
+                  <a:srgbClr val="FD0062"/>
                 </a:solidFill>
               </a:rPr>
               <a:t>What Makes Python Special?</a:t>
             </a:r>
             <a:endParaRPr lang="en-US" altLang="en-US">
               <a:solidFill>
-                <a:srgbClr val="ED3761"/>
+                <a:srgbClr val="FD0062"/>
               </a:solidFill>
             </a:endParaRPr>
           </a:p>
@@ -9388,7 +9400,7 @@
             <a:r>
               <a:rPr lang="en-US" altLang="en-US">
                 <a:solidFill>
-                  <a:srgbClr val="ED3761"/>
+                  <a:srgbClr val="FD0062"/>
                 </a:solidFill>
               </a:rPr>
               <a:t>Python isn’t the </a:t>
@@ -9396,7 +9408,7 @@
             <a:r>
               <a:rPr lang="en-US" altLang="en-US" i="1">
                 <a:solidFill>
-                  <a:srgbClr val="ED3761"/>
+                  <a:srgbClr val="FD0062"/>
                 </a:solidFill>
               </a:rPr>
               <a:t>best option</a:t>
@@ -9404,7 +9416,7 @@
             <a:r>
               <a:rPr lang="en-US" altLang="en-US">
                 <a:solidFill>
-                  <a:srgbClr val="ED3761"/>
+                  <a:srgbClr val="FD0062"/>
                 </a:solidFill>
               </a:rPr>
               <a:t> for any single application but it is </a:t>
@@ -9412,7 +9424,7 @@
             <a:r>
               <a:rPr lang="en-US" altLang="en-US" i="1">
                 <a:solidFill>
-                  <a:srgbClr val="ED3761"/>
+                  <a:srgbClr val="FD0062"/>
                 </a:solidFill>
               </a:rPr>
               <a:t>an option</a:t>
@@ -9420,7 +9432,7 @@
             <a:r>
               <a:rPr lang="en-US" altLang="en-US">
                 <a:solidFill>
-                  <a:srgbClr val="ED3761"/>
+                  <a:srgbClr val="FD0062"/>
                 </a:solidFill>
               </a:rPr>
               <a:t> for virtually all applications - one can develop initially in python then later improve back-end by porting to other languages</a:t>
@@ -9520,14 +9532,14 @@
             <a:r>
               <a:rPr lang="en-US">
                 <a:solidFill>
-                  <a:srgbClr val="ED3761"/>
+                  <a:srgbClr val="FD0062"/>
                 </a:solidFill>
               </a:rPr>
               <a:t>Course Outline</a:t>
             </a:r>
             <a:endParaRPr lang="en-US">
               <a:solidFill>
-                <a:srgbClr val="ED3761"/>
+                <a:srgbClr val="FD0062"/>
               </a:solidFill>
             </a:endParaRPr>
           </a:p>
@@ -9598,8 +9610,16 @@
               <a:buAutoNum type="arabicPeriod"/>
             </a:pPr>
             <a:r>
+              <a:rPr lang="" altLang="en-US"/>
+              <a:t>Data </a:t>
+            </a:r>
+            <a:r>
               <a:rPr lang="en-US"/>
-              <a:t>Types (Primitives, Lists, Dicts, NumPy Arrays, and Pandas DataFrames) (Aaron)</a:t>
+              <a:t>Types </a:t>
+            </a:r>
+            <a:r>
+              <a:rPr lang="" altLang="en-US"/>
+              <a:t>Deep Dive (Aaron)</a:t>
             </a:r>
             <a:endParaRPr lang="en-US"/>
           </a:p>

</xml_diff>